<commit_message>
Make color change possible
</commit_message>
<xml_diff>
--- a/snuseprofilen/instructions.pptx
+++ b/snuseprofilen/instructions.pptx
@@ -105,6 +105,11 @@
       </a:defRPr>
     </a:lvl9pPr>
   </p:defaultTextStyle>
+  <p:extLst>
+    <p:ext uri="{EFAFB233-063F-42B5-8137-9DF3F51BA10A}">
+      <p15:sldGuideLst xmlns:p15="http://schemas.microsoft.com/office/powerpoint/2012/main"/>
+    </p:ext>
+  </p:extLst>
 </p:presentation>
 </file>
 
@@ -3448,8 +3453,8 @@
         </p:nvSpPr>
         <p:spPr>
           <a:xfrm>
-            <a:off x="838200" y="1423256"/>
-            <a:ext cx="8634046" cy="4351338"/>
+            <a:off x="838200" y="1423255"/>
+            <a:ext cx="8634046" cy="4826938"/>
           </a:xfrm>
         </p:spPr>
         <p:txBody>
@@ -3478,15 +3483,7 @@
           <a:p>
             <a:r>
               <a:rPr lang="en-US" sz="2000" dirty="0"/>
-              <a:t>You can also choose a color </a:t>
-            </a:r>
-            <a:r>
-              <a:rPr lang="en-US" sz="2000" dirty="0">
-                <a:solidFill>
-                  <a:srgbClr val="FF0000"/>
-                </a:solidFill>
-              </a:rPr>
-              <a:t>(Not yet available)</a:t>
+              <a:t>You can also choose a color (write color name or hex code). This should also be separated by a comma</a:t>
             </a:r>
           </a:p>
           <a:p>
@@ -3532,16 +3529,15 @@
           </p:cNvPicPr>
           <p:nvPr/>
         </p:nvPicPr>
-        <p:blipFill>
+        <p:blipFill rotWithShape="1">
           <a:blip r:embed="rId2"/>
-          <a:stretch>
-            <a:fillRect/>
-          </a:stretch>
+          <a:srcRect r="22512" b="16038"/>
+          <a:stretch/>
         </p:blipFill>
         <p:spPr>
           <a:xfrm>
-            <a:off x="3737722" y="1972646"/>
-            <a:ext cx="502964" cy="434378"/>
+            <a:off x="3737722" y="1933318"/>
+            <a:ext cx="539310" cy="504680"/>
           </a:xfrm>
           <a:prstGeom prst="rect">
             <a:avLst/>
@@ -3569,8 +3565,8 @@
         </p:blipFill>
         <p:spPr>
           <a:xfrm>
-            <a:off x="3970140" y="2983154"/>
-            <a:ext cx="389738" cy="358172"/>
+            <a:off x="3964765" y="2905496"/>
+            <a:ext cx="539310" cy="495629"/>
           </a:xfrm>
           <a:prstGeom prst="rect">
             <a:avLst/>
@@ -3659,8 +3655,8 @@
         </p:blipFill>
         <p:spPr>
           <a:xfrm>
-            <a:off x="3811190" y="4693825"/>
-            <a:ext cx="548688" cy="358171"/>
+            <a:off x="3832283" y="4920696"/>
+            <a:ext cx="682550" cy="445553"/>
           </a:xfrm>
           <a:prstGeom prst="rect">
             <a:avLst/>
@@ -3689,7 +3685,7 @@
         </p:blipFill>
         <p:spPr>
           <a:xfrm>
-            <a:off x="1190071" y="4656943"/>
+            <a:off x="1190071" y="4958162"/>
             <a:ext cx="2651990" cy="403895"/>
           </a:xfrm>
           <a:prstGeom prst="rect">
@@ -3719,7 +3715,7 @@
         </p:blipFill>
         <p:spPr>
           <a:xfrm>
-            <a:off x="1218275" y="5707928"/>
+            <a:off x="1218275" y="5890809"/>
             <a:ext cx="2034716" cy="396274"/>
           </a:xfrm>
           <a:prstGeom prst="rect">
@@ -3741,16 +3737,118 @@
           </p:cNvPicPr>
           <p:nvPr/>
         </p:nvPicPr>
+        <p:blipFill rotWithShape="1">
+          <a:blip r:embed="rId2"/>
+          <a:srcRect t="1" r="15128" b="24415"/>
+          <a:stretch/>
+        </p:blipFill>
+        <p:spPr>
+          <a:xfrm>
+            <a:off x="3252991" y="5871757"/>
+            <a:ext cx="579292" cy="445554"/>
+          </a:xfrm>
+          <a:prstGeom prst="rect">
+            <a:avLst/>
+          </a:prstGeom>
+        </p:spPr>
+      </p:pic>
+      <p:sp>
+        <p:nvSpPr>
+          <p:cNvPr id="4" name="TextBox 3">
+            <a:extLst>
+              <a:ext uri="{FF2B5EF4-FFF2-40B4-BE49-F238E27FC236}">
+                <a16:creationId xmlns:a16="http://schemas.microsoft.com/office/drawing/2014/main" id="{477A79CE-121F-2328-EC7A-BC6CF2405DFF}"/>
+              </a:ext>
+            </a:extLst>
+          </p:cNvPr>
+          <p:cNvSpPr txBox="1"/>
+          <p:nvPr/>
+        </p:nvSpPr>
+        <p:spPr>
+          <a:xfrm>
+            <a:off x="4704318" y="3860351"/>
+            <a:ext cx="4303516" cy="523220"/>
+          </a:xfrm>
+          <a:prstGeom prst="rect">
+            <a:avLst/>
+          </a:prstGeom>
+          <a:noFill/>
+        </p:spPr>
+        <p:txBody>
+          <a:bodyPr wrap="square" rtlCol="0">
+            <a:spAutoFit/>
+          </a:bodyPr>
+          <a:lstStyle/>
+          <a:p>
+            <a:r>
+              <a:rPr lang="en-US" sz="1400" dirty="0"/>
+              <a:t>Available </a:t>
+            </a:r>
+            <a:r>
+              <a:rPr lang="en-US" sz="1400"/>
+              <a:t>color names: </a:t>
+            </a:r>
+            <a:r>
+              <a:rPr lang="en-US" sz="1400" dirty="0"/>
+              <a:t>blue, green, white, black, orange, purple, pink, yellow, brown, gray</a:t>
+            </a:r>
+          </a:p>
+        </p:txBody>
+      </p:sp>
+      <p:pic>
+        <p:nvPicPr>
+          <p:cNvPr id="6" name="Picture 5">
+            <a:extLst>
+              <a:ext uri="{FF2B5EF4-FFF2-40B4-BE49-F238E27FC236}">
+                <a16:creationId xmlns:a16="http://schemas.microsoft.com/office/drawing/2014/main" id="{F246FA81-B815-C3CE-25DE-6664B594E27A}"/>
+              </a:ext>
+            </a:extLst>
+          </p:cNvPr>
+          <p:cNvPicPr>
+            <a:picLocks noChangeAspect="1"/>
+          </p:cNvPicPr>
+          <p:nvPr/>
+        </p:nvPicPr>
         <p:blipFill>
-          <a:blip r:embed="rId2"/>
+          <a:blip r:embed="rId9"/>
           <a:stretch>
             <a:fillRect/>
           </a:stretch>
         </p:blipFill>
         <p:spPr>
           <a:xfrm>
-            <a:off x="3252991" y="5688876"/>
-            <a:ext cx="502964" cy="434378"/>
+            <a:off x="1117769" y="3974819"/>
+            <a:ext cx="3084254" cy="362853"/>
+          </a:xfrm>
+          <a:prstGeom prst="rect">
+            <a:avLst/>
+          </a:prstGeom>
+        </p:spPr>
+      </p:pic>
+      <p:pic>
+        <p:nvPicPr>
+          <p:cNvPr id="8" name="Picture 7">
+            <a:extLst>
+              <a:ext uri="{FF2B5EF4-FFF2-40B4-BE49-F238E27FC236}">
+                <a16:creationId xmlns:a16="http://schemas.microsoft.com/office/drawing/2014/main" id="{4B2D76EE-A492-73E6-0CD9-74461AA3D009}"/>
+              </a:ext>
+            </a:extLst>
+          </p:cNvPr>
+          <p:cNvPicPr>
+            <a:picLocks noChangeAspect="1"/>
+          </p:cNvPicPr>
+          <p:nvPr/>
+        </p:nvPicPr>
+        <p:blipFill>
+          <a:blip r:embed="rId10"/>
+          <a:stretch>
+            <a:fillRect/>
+          </a:stretch>
+        </p:blipFill>
+        <p:spPr>
+          <a:xfrm>
+            <a:off x="4197282" y="3908465"/>
+            <a:ext cx="539310" cy="475106"/>
           </a:xfrm>
           <a:prstGeom prst="rect">
             <a:avLst/>

</xml_diff>